<commit_message>
finished the religious category MGEFA
needs assembly
</commit_message>
<xml_diff>
--- a/personality/MGEFA_personality.pptx
+++ b/personality/MGEFA_personality.pptx
@@ -5,10 +5,9 @@
     <p:sldMasterId id="2147483648" r:id="rId1"/>
   </p:sldMasterIdLst>
   <p:sldIdLst>
-    <p:sldId id="256" r:id="rId2"/>
-    <p:sldId id="257" r:id="rId3"/>
-    <p:sldId id="258" r:id="rId4"/>
-    <p:sldId id="259" r:id="rId5"/>
+    <p:sldId id="257" r:id="rId2"/>
+    <p:sldId id="258" r:id="rId3"/>
+    <p:sldId id="259" r:id="rId4"/>
   </p:sldIdLst>
   <p:sldSz cx="9144000" cy="6858000" type="screen4x3"/>
   <p:notesSz cx="6858000" cy="9144000"/>
@@ -3098,15 +3097,315 @@
           <a:chExt cx="0" cy="0"/>
         </a:xfrm>
       </p:grpSpPr>
-      <p:sp>
-        <p:nvSpPr>
-          <p:cNvPr id="4" name="TextBox 3"/>
+      <p:pic>
+        <p:nvPicPr>
+          <p:cNvPr id="2" name="Picture 1"/>
+          <p:cNvPicPr>
+            <a:picLocks noChangeAspect="1"/>
+          </p:cNvPicPr>
+          <p:nvPr/>
+        </p:nvPicPr>
+        <p:blipFill>
+          <a:blip r:embed="rId2" cstate="print">
+            <a:extLst>
+              <a:ext uri="{28A0092B-C50C-407E-A947-70E740481C1C}">
+                <a14:useLocalDpi xmlns:a14="http://schemas.microsoft.com/office/drawing/2010/main" val="0"/>
+              </a:ext>
+            </a:extLst>
+          </a:blip>
+          <a:stretch>
+            <a:fillRect/>
+          </a:stretch>
+        </p:blipFill>
+        <p:spPr>
+          <a:xfrm>
+            <a:off x="159845" y="3511744"/>
+            <a:ext cx="2363954" cy="1575969"/>
+          </a:xfrm>
+          <a:prstGeom prst="rect">
+            <a:avLst/>
+          </a:prstGeom>
+        </p:spPr>
+      </p:pic>
+      <p:pic>
+        <p:nvPicPr>
+          <p:cNvPr id="3" name="Picture 2"/>
+          <p:cNvPicPr>
+            <a:picLocks noChangeAspect="1"/>
+          </p:cNvPicPr>
+          <p:nvPr/>
+        </p:nvPicPr>
+        <p:blipFill>
+          <a:blip r:embed="rId3" cstate="print">
+            <a:extLst>
+              <a:ext uri="{28A0092B-C50C-407E-A947-70E740481C1C}">
+                <a14:useLocalDpi xmlns:a14="http://schemas.microsoft.com/office/drawing/2010/main" val="0"/>
+              </a:ext>
+            </a:extLst>
+          </a:blip>
+          <a:stretch>
+            <a:fillRect/>
+          </a:stretch>
+        </p:blipFill>
+        <p:spPr>
+          <a:xfrm>
+            <a:off x="186563" y="5155546"/>
+            <a:ext cx="2363954" cy="1575969"/>
+          </a:xfrm>
+          <a:prstGeom prst="rect">
+            <a:avLst/>
+          </a:prstGeom>
+        </p:spPr>
+      </p:pic>
+      <p:pic>
+        <p:nvPicPr>
+          <p:cNvPr id="24" name="Picture 23"/>
+          <p:cNvPicPr>
+            <a:picLocks noChangeAspect="1"/>
+          </p:cNvPicPr>
+          <p:nvPr/>
+        </p:nvPicPr>
+        <p:blipFill>
+          <a:blip r:embed="rId4" cstate="print">
+            <a:extLst>
+              <a:ext uri="{28A0092B-C50C-407E-A947-70E740481C1C}">
+                <a14:useLocalDpi xmlns:a14="http://schemas.microsoft.com/office/drawing/2010/main" val="0"/>
+              </a:ext>
+            </a:extLst>
+          </a:blip>
+          <a:stretch>
+            <a:fillRect/>
+          </a:stretch>
+        </p:blipFill>
+        <p:spPr>
+          <a:xfrm>
+            <a:off x="7700720" y="5087713"/>
+            <a:ext cx="1257196" cy="1676261"/>
+          </a:xfrm>
+          <a:prstGeom prst="rect">
+            <a:avLst/>
+          </a:prstGeom>
+        </p:spPr>
+      </p:pic>
+      <p:pic>
+        <p:nvPicPr>
+          <p:cNvPr id="27" name="Picture 26"/>
+          <p:cNvPicPr>
+            <a:picLocks noChangeAspect="1"/>
+          </p:cNvPicPr>
+          <p:nvPr/>
+        </p:nvPicPr>
+        <p:blipFill>
+          <a:blip r:embed="rId5" cstate="print">
+            <a:extLst>
+              <a:ext uri="{28A0092B-C50C-407E-A947-70E740481C1C}">
+                <a14:useLocalDpi xmlns:a14="http://schemas.microsoft.com/office/drawing/2010/main" val="0"/>
+              </a:ext>
+            </a:extLst>
+          </a:blip>
+          <a:stretch>
+            <a:fillRect/>
+          </a:stretch>
+        </p:blipFill>
+        <p:spPr>
+          <a:xfrm>
+            <a:off x="6665318" y="5105401"/>
+            <a:ext cx="1257196" cy="1676261"/>
+          </a:xfrm>
+          <a:prstGeom prst="rect">
+            <a:avLst/>
+          </a:prstGeom>
+        </p:spPr>
+      </p:pic>
+      <p:pic>
+        <p:nvPicPr>
+          <p:cNvPr id="28" name="Picture 27"/>
+          <p:cNvPicPr>
+            <a:picLocks noChangeAspect="1"/>
+          </p:cNvPicPr>
+          <p:nvPr/>
+        </p:nvPicPr>
+        <p:blipFill>
+          <a:blip r:embed="rId6" cstate="print">
+            <a:extLst>
+              <a:ext uri="{28A0092B-C50C-407E-A947-70E740481C1C}">
+                <a14:useLocalDpi xmlns:a14="http://schemas.microsoft.com/office/drawing/2010/main" val="0"/>
+              </a:ext>
+            </a:extLst>
+          </a:blip>
+          <a:stretch>
+            <a:fillRect/>
+          </a:stretch>
+        </p:blipFill>
+        <p:spPr>
+          <a:xfrm>
+            <a:off x="5641086" y="5105401"/>
+            <a:ext cx="1257196" cy="1676261"/>
+          </a:xfrm>
+          <a:prstGeom prst="rect">
+            <a:avLst/>
+          </a:prstGeom>
+        </p:spPr>
+      </p:pic>
+      <p:pic>
+        <p:nvPicPr>
+          <p:cNvPr id="29" name="Picture 28"/>
+          <p:cNvPicPr>
+            <a:picLocks noChangeAspect="1"/>
+          </p:cNvPicPr>
+          <p:nvPr/>
+        </p:nvPicPr>
+        <p:blipFill>
+          <a:blip r:embed="rId7" cstate="print">
+            <a:extLst>
+              <a:ext uri="{28A0092B-C50C-407E-A947-70E740481C1C}">
+                <a14:useLocalDpi xmlns:a14="http://schemas.microsoft.com/office/drawing/2010/main" val="0"/>
+              </a:ext>
+            </a:extLst>
+          </a:blip>
+          <a:stretch>
+            <a:fillRect/>
+          </a:stretch>
+        </p:blipFill>
+        <p:spPr>
+          <a:xfrm>
+            <a:off x="4607918" y="5105401"/>
+            <a:ext cx="1257196" cy="1676261"/>
+          </a:xfrm>
+          <a:prstGeom prst="rect">
+            <a:avLst/>
+          </a:prstGeom>
+        </p:spPr>
+      </p:pic>
+      <p:pic>
+        <p:nvPicPr>
+          <p:cNvPr id="30" name="Picture 29"/>
+          <p:cNvPicPr>
+            <a:picLocks noChangeAspect="1"/>
+          </p:cNvPicPr>
+          <p:nvPr/>
+        </p:nvPicPr>
+        <p:blipFill>
+          <a:blip r:embed="rId8" cstate="print">
+            <a:extLst>
+              <a:ext uri="{28A0092B-C50C-407E-A947-70E740481C1C}">
+                <a14:useLocalDpi xmlns:a14="http://schemas.microsoft.com/office/drawing/2010/main" val="0"/>
+              </a:ext>
+            </a:extLst>
+          </a:blip>
+          <a:stretch>
+            <a:fillRect/>
+          </a:stretch>
+        </p:blipFill>
+        <p:spPr>
+          <a:xfrm>
+            <a:off x="3583686" y="5105539"/>
+            <a:ext cx="1257196" cy="1676261"/>
+          </a:xfrm>
+          <a:prstGeom prst="rect">
+            <a:avLst/>
+          </a:prstGeom>
+        </p:spPr>
+      </p:pic>
+      <p:pic>
+        <p:nvPicPr>
+          <p:cNvPr id="31" name="Picture 30"/>
+          <p:cNvPicPr>
+            <a:picLocks noChangeAspect="1"/>
+          </p:cNvPicPr>
+          <p:nvPr/>
+        </p:nvPicPr>
+        <p:blipFill>
+          <a:blip r:embed="rId9" cstate="print">
+            <a:extLst>
+              <a:ext uri="{28A0092B-C50C-407E-A947-70E740481C1C}">
+                <a14:useLocalDpi xmlns:a14="http://schemas.microsoft.com/office/drawing/2010/main" val="0"/>
+              </a:ext>
+            </a:extLst>
+          </a:blip>
+          <a:stretch>
+            <a:fillRect/>
+          </a:stretch>
+        </p:blipFill>
+        <p:spPr>
+          <a:xfrm>
+            <a:off x="2550518" y="5105401"/>
+            <a:ext cx="1257196" cy="1676261"/>
+          </a:xfrm>
+          <a:prstGeom prst="rect">
+            <a:avLst/>
+          </a:prstGeom>
+        </p:spPr>
+      </p:pic>
+      <p:pic>
+        <p:nvPicPr>
+          <p:cNvPr id="5" name="Picture 4"/>
+          <p:cNvPicPr>
+            <a:picLocks noChangeAspect="1"/>
+          </p:cNvPicPr>
+          <p:nvPr/>
+        </p:nvPicPr>
+        <p:blipFill>
+          <a:blip r:embed="rId6">
+            <a:extLst>
+              <a:ext uri="{28A0092B-C50C-407E-A947-70E740481C1C}">
+                <a14:useLocalDpi xmlns:a14="http://schemas.microsoft.com/office/drawing/2010/main" val="0"/>
+              </a:ext>
+            </a:extLst>
+          </a:blip>
+          <a:stretch>
+            <a:fillRect/>
+          </a:stretch>
+        </p:blipFill>
+        <p:spPr>
+          <a:xfrm>
+            <a:off x="5397852" y="0"/>
+            <a:ext cx="3560064" cy="4746752"/>
+          </a:xfrm>
+          <a:prstGeom prst="rect">
+            <a:avLst/>
+          </a:prstGeom>
+        </p:spPr>
+      </p:pic>
+      <p:pic>
+        <p:nvPicPr>
+          <p:cNvPr id="6" name="Picture 5"/>
+          <p:cNvPicPr>
+            <a:picLocks noChangeAspect="1"/>
+          </p:cNvPicPr>
+          <p:nvPr/>
+        </p:nvPicPr>
+        <p:blipFill>
+          <a:blip r:embed="rId10">
+            <a:extLst>
+              <a:ext uri="{28A0092B-C50C-407E-A947-70E740481C1C}">
+                <a14:useLocalDpi xmlns:a14="http://schemas.microsoft.com/office/drawing/2010/main" val="0"/>
+              </a:ext>
+            </a:extLst>
+          </a:blip>
+          <a:stretch>
+            <a:fillRect/>
+          </a:stretch>
+        </p:blipFill>
+        <p:spPr>
+          <a:xfrm>
+            <a:off x="2802474" y="58202"/>
+            <a:ext cx="2604750" cy="4688550"/>
+          </a:xfrm>
+          <a:prstGeom prst="rect">
+            <a:avLst/>
+          </a:prstGeom>
+        </p:spPr>
+      </p:pic>
+      <p:sp>
+        <p:nvSpPr>
+          <p:cNvPr id="13" name="TextBox 12"/>
           <p:cNvSpPr txBox="1"/>
           <p:nvPr/>
         </p:nvSpPr>
         <p:spPr>
           <a:xfrm>
-            <a:off x="264590" y="1831882"/>
+            <a:off x="5899230" y="4833797"/>
             <a:ext cx="740908" cy="253916"/>
           </a:xfrm>
           <a:prstGeom prst="rect">
@@ -3130,13 +3429,13 @@
       </p:sp>
       <p:sp>
         <p:nvSpPr>
-          <p:cNvPr id="5" name="TextBox 4"/>
+          <p:cNvPr id="14" name="TextBox 13"/>
           <p:cNvSpPr txBox="1"/>
           <p:nvPr/>
         </p:nvSpPr>
         <p:spPr>
           <a:xfrm>
-            <a:off x="1405219" y="1863095"/>
+            <a:off x="6986780" y="4833797"/>
             <a:ext cx="614271" cy="253916"/>
           </a:xfrm>
           <a:prstGeom prst="rect">
@@ -3160,13 +3459,13 @@
       </p:sp>
       <p:sp>
         <p:nvSpPr>
-          <p:cNvPr id="6" name="TextBox 5"/>
+          <p:cNvPr id="15" name="TextBox 14"/>
           <p:cNvSpPr txBox="1"/>
           <p:nvPr/>
         </p:nvSpPr>
         <p:spPr>
           <a:xfrm>
-            <a:off x="2221013" y="1863095"/>
+            <a:off x="7807380" y="4851484"/>
             <a:ext cx="1043876" cy="253916"/>
           </a:xfrm>
           <a:prstGeom prst="rect">
@@ -3190,13 +3489,13 @@
       </p:sp>
       <p:sp>
         <p:nvSpPr>
-          <p:cNvPr id="7" name="TextBox 6"/>
+          <p:cNvPr id="16" name="TextBox 15"/>
           <p:cNvSpPr txBox="1"/>
           <p:nvPr/>
         </p:nvSpPr>
         <p:spPr>
           <a:xfrm>
-            <a:off x="341179" y="152400"/>
+            <a:off x="2807511" y="4868433"/>
             <a:ext cx="776175" cy="261610"/>
           </a:xfrm>
           <a:prstGeom prst="rect">
@@ -3220,13 +3519,13 @@
       </p:sp>
       <p:sp>
         <p:nvSpPr>
-          <p:cNvPr id="8" name="TextBox 7"/>
+          <p:cNvPr id="17" name="TextBox 16"/>
           <p:cNvSpPr txBox="1"/>
           <p:nvPr/>
         </p:nvSpPr>
         <p:spPr>
           <a:xfrm>
-            <a:off x="1424035" y="153660"/>
+            <a:off x="3896332" y="4851623"/>
             <a:ext cx="631904" cy="253916"/>
           </a:xfrm>
           <a:prstGeom prst="rect">
@@ -3250,13 +3549,13 @@
       </p:sp>
       <p:sp>
         <p:nvSpPr>
-          <p:cNvPr id="9" name="TextBox 8"/>
+          <p:cNvPr id="18" name="TextBox 17"/>
           <p:cNvSpPr txBox="1"/>
           <p:nvPr/>
         </p:nvSpPr>
         <p:spPr>
           <a:xfrm>
-            <a:off x="2443029" y="152400"/>
+            <a:off x="4967313" y="4851623"/>
             <a:ext cx="599844" cy="253916"/>
           </a:xfrm>
           <a:prstGeom prst="rect">
@@ -3281,7 +3580,7 @@
     </p:spTree>
     <p:extLst>
       <p:ext uri="{BB962C8B-B14F-4D97-AF65-F5344CB8AC3E}">
-        <p14:creationId xmlns:p14="http://schemas.microsoft.com/office/powerpoint/2010/main" val="4209664041"/>
+        <p14:creationId xmlns:p14="http://schemas.microsoft.com/office/powerpoint/2010/main" val="4233547280"/>
       </p:ext>
     </p:extLst>
   </p:cSld>
@@ -3338,7 +3637,7 @@
         <p:spPr>
           <a:xfrm>
             <a:off x="159845" y="3511744"/>
-            <a:ext cx="2363954" cy="1575969"/>
+            <a:ext cx="2363953" cy="1575969"/>
           </a:xfrm>
           <a:prstGeom prst="rect">
             <a:avLst/>
@@ -3368,7 +3667,7 @@
         <p:spPr>
           <a:xfrm>
             <a:off x="186563" y="5155546"/>
-            <a:ext cx="2363954" cy="1575969"/>
+            <a:ext cx="2363953" cy="1575969"/>
           </a:xfrm>
           <a:prstGeom prst="rect">
             <a:avLst/>
@@ -3398,7 +3697,7 @@
         <p:spPr>
           <a:xfrm>
             <a:off x="7700720" y="5087713"/>
-            <a:ext cx="1257196" cy="1676261"/>
+            <a:ext cx="1257195" cy="1676261"/>
           </a:xfrm>
           <a:prstGeom prst="rect">
             <a:avLst/>
@@ -3428,7 +3727,7 @@
         <p:spPr>
           <a:xfrm>
             <a:off x="6665318" y="5105401"/>
-            <a:ext cx="1257196" cy="1676261"/>
+            <a:ext cx="1257195" cy="1676261"/>
           </a:xfrm>
           <a:prstGeom prst="rect">
             <a:avLst/>
@@ -3458,7 +3757,7 @@
         <p:spPr>
           <a:xfrm>
             <a:off x="5641086" y="5105401"/>
-            <a:ext cx="1257196" cy="1676261"/>
+            <a:ext cx="1257195" cy="1676261"/>
           </a:xfrm>
           <a:prstGeom prst="rect">
             <a:avLst/>
@@ -3488,7 +3787,7 @@
         <p:spPr>
           <a:xfrm>
             <a:off x="4607918" y="5105401"/>
-            <a:ext cx="1257196" cy="1676261"/>
+            <a:ext cx="1257195" cy="1676261"/>
           </a:xfrm>
           <a:prstGeom prst="rect">
             <a:avLst/>
@@ -3518,7 +3817,7 @@
         <p:spPr>
           <a:xfrm>
             <a:off x="3583686" y="5105539"/>
-            <a:ext cx="1257196" cy="1676261"/>
+            <a:ext cx="1257195" cy="1676261"/>
           </a:xfrm>
           <a:prstGeom prst="rect">
             <a:avLst/>
@@ -3548,7 +3847,7 @@
         <p:spPr>
           <a:xfrm>
             <a:off x="2550518" y="5105401"/>
-            <a:ext cx="1257196" cy="1676261"/>
+            <a:ext cx="1257195" cy="1676261"/>
           </a:xfrm>
           <a:prstGeom prst="rect">
             <a:avLst/>
@@ -3578,7 +3877,7 @@
         <p:spPr>
           <a:xfrm>
             <a:off x="5397852" y="0"/>
-            <a:ext cx="3560064" cy="4746752"/>
+            <a:ext cx="3560063" cy="4746752"/>
           </a:xfrm>
           <a:prstGeom prst="rect">
             <a:avLst/>
@@ -3608,523 +3907,6 @@
         <p:spPr>
           <a:xfrm>
             <a:off x="2802474" y="58202"/>
-            <a:ext cx="2604750" cy="4688550"/>
-          </a:xfrm>
-          <a:prstGeom prst="rect">
-            <a:avLst/>
-          </a:prstGeom>
-        </p:spPr>
-      </p:pic>
-      <p:sp>
-        <p:nvSpPr>
-          <p:cNvPr id="13" name="TextBox 12"/>
-          <p:cNvSpPr txBox="1"/>
-          <p:nvPr/>
-        </p:nvSpPr>
-        <p:spPr>
-          <a:xfrm>
-            <a:off x="5899230" y="4833797"/>
-            <a:ext cx="740908" cy="253916"/>
-          </a:xfrm>
-          <a:prstGeom prst="rect">
-            <a:avLst/>
-          </a:prstGeom>
-          <a:noFill/>
-        </p:spPr>
-        <p:txBody>
-          <a:bodyPr wrap="none" rtlCol="0">
-            <a:spAutoFit/>
-          </a:bodyPr>
-          <a:lstStyle/>
-          <a:p>
-            <a:r>
-              <a:rPr lang="en-US" sz="1050" dirty="0" smtClean="0"/>
-              <a:t>Quartimin</a:t>
-            </a:r>
-            <a:endParaRPr lang="en-US" sz="1050" dirty="0"/>
-          </a:p>
-        </p:txBody>
-      </p:sp>
-      <p:sp>
-        <p:nvSpPr>
-          <p:cNvPr id="14" name="TextBox 13"/>
-          <p:cNvSpPr txBox="1"/>
-          <p:nvPr/>
-        </p:nvSpPr>
-        <p:spPr>
-          <a:xfrm>
-            <a:off x="6986780" y="4833797"/>
-            <a:ext cx="614271" cy="253916"/>
-          </a:xfrm>
-          <a:prstGeom prst="rect">
-            <a:avLst/>
-          </a:prstGeom>
-          <a:noFill/>
-        </p:spPr>
-        <p:txBody>
-          <a:bodyPr wrap="none" rtlCol="0">
-            <a:spAutoFit/>
-          </a:bodyPr>
-          <a:lstStyle/>
-          <a:p>
-            <a:r>
-              <a:rPr lang="en-US" sz="1050" dirty="0" smtClean="0"/>
-              <a:t>Bifactor</a:t>
-            </a:r>
-            <a:endParaRPr lang="en-US" sz="1050" dirty="0"/>
-          </a:p>
-        </p:txBody>
-      </p:sp>
-      <p:sp>
-        <p:nvSpPr>
-          <p:cNvPr id="15" name="TextBox 14"/>
-          <p:cNvSpPr txBox="1"/>
-          <p:nvPr/>
-        </p:nvSpPr>
-        <p:spPr>
-          <a:xfrm>
-            <a:off x="7807380" y="4851484"/>
-            <a:ext cx="1043876" cy="253916"/>
-          </a:xfrm>
-          <a:prstGeom prst="rect">
-            <a:avLst/>
-          </a:prstGeom>
-          <a:noFill/>
-        </p:spPr>
-        <p:txBody>
-          <a:bodyPr wrap="none" rtlCol="0">
-            <a:spAutoFit/>
-          </a:bodyPr>
-          <a:lstStyle/>
-          <a:p>
-            <a:r>
-              <a:rPr lang="en-US" sz="1050" dirty="0" smtClean="0"/>
-              <a:t>BifactorOblique</a:t>
-            </a:r>
-            <a:endParaRPr lang="en-US" sz="1050" dirty="0"/>
-          </a:p>
-        </p:txBody>
-      </p:sp>
-      <p:sp>
-        <p:nvSpPr>
-          <p:cNvPr id="16" name="TextBox 15"/>
-          <p:cNvSpPr txBox="1"/>
-          <p:nvPr/>
-        </p:nvSpPr>
-        <p:spPr>
-          <a:xfrm>
-            <a:off x="2807511" y="4868433"/>
-            <a:ext cx="776175" cy="261610"/>
-          </a:xfrm>
-          <a:prstGeom prst="rect">
-            <a:avLst/>
-          </a:prstGeom>
-          <a:noFill/>
-        </p:spPr>
-        <p:txBody>
-          <a:bodyPr wrap="none" rtlCol="0">
-            <a:spAutoFit/>
-          </a:bodyPr>
-          <a:lstStyle/>
-          <a:p>
-            <a:r>
-              <a:rPr lang="en-US" sz="1050" dirty="0" smtClean="0"/>
-              <a:t>Unrotated</a:t>
-            </a:r>
-            <a:endParaRPr lang="en-US" sz="1050" dirty="0"/>
-          </a:p>
-        </p:txBody>
-      </p:sp>
-      <p:sp>
-        <p:nvSpPr>
-          <p:cNvPr id="17" name="TextBox 16"/>
-          <p:cNvSpPr txBox="1"/>
-          <p:nvPr/>
-        </p:nvSpPr>
-        <p:spPr>
-          <a:xfrm>
-            <a:off x="3896332" y="4851623"/>
-            <a:ext cx="631904" cy="253916"/>
-          </a:xfrm>
-          <a:prstGeom prst="rect">
-            <a:avLst/>
-          </a:prstGeom>
-          <a:noFill/>
-        </p:spPr>
-        <p:txBody>
-          <a:bodyPr wrap="none" rtlCol="0">
-            <a:spAutoFit/>
-          </a:bodyPr>
-          <a:lstStyle/>
-          <a:p>
-            <a:r>
-              <a:rPr lang="en-US" sz="1050" dirty="0" smtClean="0"/>
-              <a:t>Varimax</a:t>
-            </a:r>
-            <a:endParaRPr lang="en-US" sz="1050" dirty="0"/>
-          </a:p>
-        </p:txBody>
-      </p:sp>
-      <p:sp>
-        <p:nvSpPr>
-          <p:cNvPr id="18" name="TextBox 17"/>
-          <p:cNvSpPr txBox="1"/>
-          <p:nvPr/>
-        </p:nvSpPr>
-        <p:spPr>
-          <a:xfrm>
-            <a:off x="4967313" y="4851623"/>
-            <a:ext cx="599844" cy="253916"/>
-          </a:xfrm>
-          <a:prstGeom prst="rect">
-            <a:avLst/>
-          </a:prstGeom>
-          <a:noFill/>
-        </p:spPr>
-        <p:txBody>
-          <a:bodyPr wrap="none" rtlCol="0">
-            <a:spAutoFit/>
-          </a:bodyPr>
-          <a:lstStyle/>
-          <a:p>
-            <a:r>
-              <a:rPr lang="en-US" sz="1050" dirty="0" smtClean="0"/>
-              <a:t>Promax</a:t>
-            </a:r>
-            <a:endParaRPr lang="en-US" sz="1050" dirty="0"/>
-          </a:p>
-        </p:txBody>
-      </p:sp>
-    </p:spTree>
-    <p:extLst>
-      <p:ext uri="{BB962C8B-B14F-4D97-AF65-F5344CB8AC3E}">
-        <p14:creationId xmlns:p14="http://schemas.microsoft.com/office/powerpoint/2010/main" val="4233547280"/>
-      </p:ext>
-    </p:extLst>
-  </p:cSld>
-  <p:clrMapOvr>
-    <a:masterClrMapping/>
-  </p:clrMapOvr>
-  <p:timing>
-    <p:tnLst>
-      <p:par>
-        <p:cTn id="1" dur="indefinite" restart="never" nodeType="tmRoot"/>
-      </p:par>
-    </p:tnLst>
-  </p:timing>
-</p:sld>
-</file>
-
-<file path=ppt/slides/slide3.xml><?xml version="1.0" encoding="utf-8"?>
-<p:sld xmlns:a="http://schemas.openxmlformats.org/drawingml/2006/main" xmlns:r="http://schemas.openxmlformats.org/officeDocument/2006/relationships" xmlns:p="http://schemas.openxmlformats.org/presentationml/2006/main">
-  <p:cSld>
-    <p:spTree>
-      <p:nvGrpSpPr>
-        <p:cNvPr id="1" name=""/>
-        <p:cNvGrpSpPr/>
-        <p:nvPr/>
-      </p:nvGrpSpPr>
-      <p:grpSpPr>
-        <a:xfrm>
-          <a:off x="0" y="0"/>
-          <a:ext cx="0" cy="0"/>
-          <a:chOff x="0" y="0"/>
-          <a:chExt cx="0" cy="0"/>
-        </a:xfrm>
-      </p:grpSpPr>
-      <p:pic>
-        <p:nvPicPr>
-          <p:cNvPr id="2" name="Picture 1"/>
-          <p:cNvPicPr>
-            <a:picLocks noChangeAspect="1"/>
-          </p:cNvPicPr>
-          <p:nvPr/>
-        </p:nvPicPr>
-        <p:blipFill>
-          <a:blip r:embed="rId2" cstate="print">
-            <a:extLst>
-              <a:ext uri="{28A0092B-C50C-407E-A947-70E740481C1C}">
-                <a14:useLocalDpi xmlns:a14="http://schemas.microsoft.com/office/drawing/2010/main" val="0"/>
-              </a:ext>
-            </a:extLst>
-          </a:blip>
-          <a:stretch>
-            <a:fillRect/>
-          </a:stretch>
-        </p:blipFill>
-        <p:spPr>
-          <a:xfrm>
-            <a:off x="159845" y="3511744"/>
-            <a:ext cx="2363953" cy="1575969"/>
-          </a:xfrm>
-          <a:prstGeom prst="rect">
-            <a:avLst/>
-          </a:prstGeom>
-        </p:spPr>
-      </p:pic>
-      <p:pic>
-        <p:nvPicPr>
-          <p:cNvPr id="3" name="Picture 2"/>
-          <p:cNvPicPr>
-            <a:picLocks noChangeAspect="1"/>
-          </p:cNvPicPr>
-          <p:nvPr/>
-        </p:nvPicPr>
-        <p:blipFill>
-          <a:blip r:embed="rId3" cstate="print">
-            <a:extLst>
-              <a:ext uri="{28A0092B-C50C-407E-A947-70E740481C1C}">
-                <a14:useLocalDpi xmlns:a14="http://schemas.microsoft.com/office/drawing/2010/main" val="0"/>
-              </a:ext>
-            </a:extLst>
-          </a:blip>
-          <a:stretch>
-            <a:fillRect/>
-          </a:stretch>
-        </p:blipFill>
-        <p:spPr>
-          <a:xfrm>
-            <a:off x="186563" y="5155546"/>
-            <a:ext cx="2363953" cy="1575969"/>
-          </a:xfrm>
-          <a:prstGeom prst="rect">
-            <a:avLst/>
-          </a:prstGeom>
-        </p:spPr>
-      </p:pic>
-      <p:pic>
-        <p:nvPicPr>
-          <p:cNvPr id="24" name="Picture 23"/>
-          <p:cNvPicPr>
-            <a:picLocks noChangeAspect="1"/>
-          </p:cNvPicPr>
-          <p:nvPr/>
-        </p:nvPicPr>
-        <p:blipFill>
-          <a:blip r:embed="rId4" cstate="print">
-            <a:extLst>
-              <a:ext uri="{28A0092B-C50C-407E-A947-70E740481C1C}">
-                <a14:useLocalDpi xmlns:a14="http://schemas.microsoft.com/office/drawing/2010/main" val="0"/>
-              </a:ext>
-            </a:extLst>
-          </a:blip>
-          <a:stretch>
-            <a:fillRect/>
-          </a:stretch>
-        </p:blipFill>
-        <p:spPr>
-          <a:xfrm>
-            <a:off x="7700720" y="5087713"/>
-            <a:ext cx="1257195" cy="1676261"/>
-          </a:xfrm>
-          <a:prstGeom prst="rect">
-            <a:avLst/>
-          </a:prstGeom>
-        </p:spPr>
-      </p:pic>
-      <p:pic>
-        <p:nvPicPr>
-          <p:cNvPr id="27" name="Picture 26"/>
-          <p:cNvPicPr>
-            <a:picLocks noChangeAspect="1"/>
-          </p:cNvPicPr>
-          <p:nvPr/>
-        </p:nvPicPr>
-        <p:blipFill>
-          <a:blip r:embed="rId5" cstate="print">
-            <a:extLst>
-              <a:ext uri="{28A0092B-C50C-407E-A947-70E740481C1C}">
-                <a14:useLocalDpi xmlns:a14="http://schemas.microsoft.com/office/drawing/2010/main" val="0"/>
-              </a:ext>
-            </a:extLst>
-          </a:blip>
-          <a:stretch>
-            <a:fillRect/>
-          </a:stretch>
-        </p:blipFill>
-        <p:spPr>
-          <a:xfrm>
-            <a:off x="6665318" y="5105401"/>
-            <a:ext cx="1257195" cy="1676261"/>
-          </a:xfrm>
-          <a:prstGeom prst="rect">
-            <a:avLst/>
-          </a:prstGeom>
-        </p:spPr>
-      </p:pic>
-      <p:pic>
-        <p:nvPicPr>
-          <p:cNvPr id="28" name="Picture 27"/>
-          <p:cNvPicPr>
-            <a:picLocks noChangeAspect="1"/>
-          </p:cNvPicPr>
-          <p:nvPr/>
-        </p:nvPicPr>
-        <p:blipFill>
-          <a:blip r:embed="rId6" cstate="print">
-            <a:extLst>
-              <a:ext uri="{28A0092B-C50C-407E-A947-70E740481C1C}">
-                <a14:useLocalDpi xmlns:a14="http://schemas.microsoft.com/office/drawing/2010/main" val="0"/>
-              </a:ext>
-            </a:extLst>
-          </a:blip>
-          <a:stretch>
-            <a:fillRect/>
-          </a:stretch>
-        </p:blipFill>
-        <p:spPr>
-          <a:xfrm>
-            <a:off x="5641086" y="5105401"/>
-            <a:ext cx="1257195" cy="1676261"/>
-          </a:xfrm>
-          <a:prstGeom prst="rect">
-            <a:avLst/>
-          </a:prstGeom>
-        </p:spPr>
-      </p:pic>
-      <p:pic>
-        <p:nvPicPr>
-          <p:cNvPr id="29" name="Picture 28"/>
-          <p:cNvPicPr>
-            <a:picLocks noChangeAspect="1"/>
-          </p:cNvPicPr>
-          <p:nvPr/>
-        </p:nvPicPr>
-        <p:blipFill>
-          <a:blip r:embed="rId7" cstate="print">
-            <a:extLst>
-              <a:ext uri="{28A0092B-C50C-407E-A947-70E740481C1C}">
-                <a14:useLocalDpi xmlns:a14="http://schemas.microsoft.com/office/drawing/2010/main" val="0"/>
-              </a:ext>
-            </a:extLst>
-          </a:blip>
-          <a:stretch>
-            <a:fillRect/>
-          </a:stretch>
-        </p:blipFill>
-        <p:spPr>
-          <a:xfrm>
-            <a:off x="4607918" y="5105401"/>
-            <a:ext cx="1257195" cy="1676261"/>
-          </a:xfrm>
-          <a:prstGeom prst="rect">
-            <a:avLst/>
-          </a:prstGeom>
-        </p:spPr>
-      </p:pic>
-      <p:pic>
-        <p:nvPicPr>
-          <p:cNvPr id="30" name="Picture 29"/>
-          <p:cNvPicPr>
-            <a:picLocks noChangeAspect="1"/>
-          </p:cNvPicPr>
-          <p:nvPr/>
-        </p:nvPicPr>
-        <p:blipFill>
-          <a:blip r:embed="rId8" cstate="print">
-            <a:extLst>
-              <a:ext uri="{28A0092B-C50C-407E-A947-70E740481C1C}">
-                <a14:useLocalDpi xmlns:a14="http://schemas.microsoft.com/office/drawing/2010/main" val="0"/>
-              </a:ext>
-            </a:extLst>
-          </a:blip>
-          <a:stretch>
-            <a:fillRect/>
-          </a:stretch>
-        </p:blipFill>
-        <p:spPr>
-          <a:xfrm>
-            <a:off x="3583686" y="5105539"/>
-            <a:ext cx="1257195" cy="1676261"/>
-          </a:xfrm>
-          <a:prstGeom prst="rect">
-            <a:avLst/>
-          </a:prstGeom>
-        </p:spPr>
-      </p:pic>
-      <p:pic>
-        <p:nvPicPr>
-          <p:cNvPr id="31" name="Picture 30"/>
-          <p:cNvPicPr>
-            <a:picLocks noChangeAspect="1"/>
-          </p:cNvPicPr>
-          <p:nvPr/>
-        </p:nvPicPr>
-        <p:blipFill>
-          <a:blip r:embed="rId9" cstate="print">
-            <a:extLst>
-              <a:ext uri="{28A0092B-C50C-407E-A947-70E740481C1C}">
-                <a14:useLocalDpi xmlns:a14="http://schemas.microsoft.com/office/drawing/2010/main" val="0"/>
-              </a:ext>
-            </a:extLst>
-          </a:blip>
-          <a:stretch>
-            <a:fillRect/>
-          </a:stretch>
-        </p:blipFill>
-        <p:spPr>
-          <a:xfrm>
-            <a:off x="2550518" y="5105401"/>
-            <a:ext cx="1257195" cy="1676261"/>
-          </a:xfrm>
-          <a:prstGeom prst="rect">
-            <a:avLst/>
-          </a:prstGeom>
-        </p:spPr>
-      </p:pic>
-      <p:pic>
-        <p:nvPicPr>
-          <p:cNvPr id="5" name="Picture 4"/>
-          <p:cNvPicPr>
-            <a:picLocks noChangeAspect="1"/>
-          </p:cNvPicPr>
-          <p:nvPr/>
-        </p:nvPicPr>
-        <p:blipFill>
-          <a:blip r:embed="rId6">
-            <a:extLst>
-              <a:ext uri="{28A0092B-C50C-407E-A947-70E740481C1C}">
-                <a14:useLocalDpi xmlns:a14="http://schemas.microsoft.com/office/drawing/2010/main" val="0"/>
-              </a:ext>
-            </a:extLst>
-          </a:blip>
-          <a:stretch>
-            <a:fillRect/>
-          </a:stretch>
-        </p:blipFill>
-        <p:spPr>
-          <a:xfrm>
-            <a:off x="5397852" y="0"/>
-            <a:ext cx="3560063" cy="4746752"/>
-          </a:xfrm>
-          <a:prstGeom prst="rect">
-            <a:avLst/>
-          </a:prstGeom>
-        </p:spPr>
-      </p:pic>
-      <p:pic>
-        <p:nvPicPr>
-          <p:cNvPr id="6" name="Picture 5"/>
-          <p:cNvPicPr>
-            <a:picLocks noChangeAspect="1"/>
-          </p:cNvPicPr>
-          <p:nvPr/>
-        </p:nvPicPr>
-        <p:blipFill>
-          <a:blip r:embed="rId10">
-            <a:extLst>
-              <a:ext uri="{28A0092B-C50C-407E-A947-70E740481C1C}">
-                <a14:useLocalDpi xmlns:a14="http://schemas.microsoft.com/office/drawing/2010/main" val="0"/>
-              </a:ext>
-            </a:extLst>
-          </a:blip>
-          <a:stretch>
-            <a:fillRect/>
-          </a:stretch>
-        </p:blipFill>
-        <p:spPr>
-          <a:xfrm>
-            <a:off x="2802474" y="58202"/>
             <a:ext cx="2604750" cy="4688549"/>
           </a:xfrm>
           <a:prstGeom prst="rect">
@@ -4332,7 +4114,7 @@
 </p:sld>
 </file>
 
-<file path=ppt/slides/slide4.xml><?xml version="1.0" encoding="utf-8"?>
+<file path=ppt/slides/slide3.xml><?xml version="1.0" encoding="utf-8"?>
 <p:sld xmlns:a="http://schemas.openxmlformats.org/drawingml/2006/main" xmlns:r="http://schemas.openxmlformats.org/officeDocument/2006/relationships" xmlns:p="http://schemas.openxmlformats.org/presentationml/2006/main">
   <p:cSld>
     <p:spTree>

</xml_diff>